<commit_message>
fixed repository schema pptx
</commit_message>
<xml_diff>
--- a/images/rdf_doc/RepositorySchema.pptx
+++ b/images/rdf_doc/RepositorySchema.pptx
@@ -8,8 +8,8 @@
     <p:notesMasterId r:id="rId17"/>
   </p:notesMasterIdLst>
   <p:sldIdLst>
-    <p:sldId id="271" r:id="rId2"/>
-    <p:sldId id="262" r:id="rId3"/>
+    <p:sldId id="262" r:id="rId2"/>
+    <p:sldId id="273" r:id="rId3"/>
     <p:sldId id="270" r:id="rId4"/>
     <p:sldId id="272" r:id="rId5"/>
     <p:sldId id="269" r:id="rId6"/>
@@ -206,7 +206,7 @@
           <a:p>
             <a:fld id="{64916431-A3FF-ED4C-B6D2-962974E28FC0}" type="datetimeFigureOut">
               <a:rPr kumimoji="1" lang="ja-JP" altLang="en-US" smtClean="0"/>
-              <a:t>2015/07/07</a:t>
+              <a:t>16/12/08</a:t>
             </a:fld>
             <a:endParaRPr kumimoji="1" lang="ja-JP" altLang="en-US"/>
           </a:p>
@@ -723,7 +723,7 @@
           <a:p>
             <a:fld id="{B7A085AE-BE5F-794B-9BDA-88D91522557F}" type="slidenum">
               <a:rPr kumimoji="1" lang="ja-JP" altLang="en-US" smtClean="0"/>
-              <a:t>2</a:t>
+              <a:t>1</a:t>
             </a:fld>
             <a:endParaRPr kumimoji="1" lang="ja-JP" altLang="en-US"/>
           </a:p>
@@ -787,20 +787,8 @@
           <a:lstStyle/>
           <a:p>
             <a:r>
-              <a:rPr kumimoji="1" lang="en-US" altLang="ja-JP" dirty="0" smtClean="0"/>
-              <a:t>Accession Number   </a:t>
-            </a:r>
-            <a:r>
               <a:rPr kumimoji="1" lang="en-US" altLang="ja-JP" dirty="0" err="1" smtClean="0"/>
-              <a:t>Glytoucan</a:t>
-            </a:r>
-            <a:r>
-              <a:rPr kumimoji="1" lang="en-US" altLang="ja-JP" baseline="0" dirty="0" smtClean="0"/>
-              <a:t> URL </a:t>
-            </a:r>
-            <a:r>
-              <a:rPr kumimoji="1" lang="en-US" altLang="ja-JP" baseline="0" dirty="0" err="1" smtClean="0"/>
-              <a:t>has_primary_id</a:t>
+              <a:t>has_motif</a:t>
             </a:r>
             <a:r>
               <a:rPr kumimoji="1" lang="en-US" altLang="ja-JP" baseline="0" dirty="0" smtClean="0"/>
@@ -808,36 +796,21 @@
             </a:r>
             <a:r>
               <a:rPr kumimoji="1" lang="en-US" altLang="ja-JP" baseline="0" dirty="0" err="1" smtClean="0"/>
-              <a:t>is_subsumed_by</a:t>
-            </a:r>
-            <a:r>
-              <a:rPr kumimoji="1" lang="en-US" altLang="ja-JP" baseline="0" dirty="0" smtClean="0"/>
-              <a:t>    </a:t>
-            </a:r>
-            <a:r>
-              <a:rPr kumimoji="1" lang="en-US" altLang="ja-JP" baseline="0" dirty="0" err="1" smtClean="0"/>
               <a:t>is_linkage_isomer</a:t>
             </a:r>
             <a:r>
               <a:rPr kumimoji="1" lang="en-US" altLang="ja-JP" baseline="0" dirty="0" smtClean="0"/>
               <a:t>  </a:t>
             </a:r>
-            <a:r>
-              <a:rPr kumimoji="1" lang="en-US" altLang="ja-JP" baseline="0" dirty="0" err="1" smtClean="0"/>
-              <a:t>is_substructure</a:t>
-            </a:r>
+          </a:p>
+          <a:p>
+            <a:endParaRPr kumimoji="1" lang="en-US" altLang="ja-JP" baseline="0" dirty="0" smtClean="0"/>
+          </a:p>
+          <a:p>
             <a:r>
               <a:rPr kumimoji="1" lang="en-US" altLang="ja-JP" baseline="0" dirty="0" smtClean="0"/>
-              <a:t>   </a:t>
-            </a:r>
-            <a:r>
-              <a:rPr kumimoji="1" lang="en-US" altLang="ja-JP" baseline="0" dirty="0" err="1" smtClean="0"/>
-              <a:t>is_superstructure</a:t>
-            </a:r>
-            <a:endParaRPr kumimoji="1" lang="en-US" altLang="ja-JP" baseline="0" dirty="0" smtClean="0"/>
-          </a:p>
-          <a:p>
-            <a:endParaRPr kumimoji="1" lang="en-US" altLang="ja-JP" baseline="0" dirty="0" smtClean="0"/>
+              <a:t>G63838JW</a:t>
+            </a:r>
           </a:p>
           <a:p>
             <a:r>
@@ -849,19 +822,10 @@
                 <a:ea typeface="+mn-ea"/>
                 <a:cs typeface="+mn-cs"/>
               </a:rPr>
-              <a:t>native and </a:t>
-            </a:r>
-            <a:r>
-              <a:rPr kumimoji="1" lang="en-US" altLang="ja-JP" sz="1700" kern="1200" dirty="0" err="1" smtClean="0">
-                <a:solidFill>
-                  <a:schemeClr val="tx1"/>
-                </a:solidFill>
-                <a:latin typeface="+mn-lt"/>
-                <a:ea typeface="+mn-ea"/>
-                <a:cs typeface="+mn-cs"/>
-              </a:rPr>
-              <a:t>derivatized</a:t>
-            </a:r>
+              <a:t>G22768VO	</a:t>
+            </a:r>
+          </a:p>
+          <a:p>
             <a:r>
               <a:rPr kumimoji="1" lang="en-US" altLang="ja-JP" sz="1700" kern="1200" dirty="0" smtClean="0">
                 <a:solidFill>
@@ -871,19 +835,10 @@
                 <a:ea typeface="+mn-ea"/>
                 <a:cs typeface="+mn-cs"/>
               </a:rPr>
-              <a:t> structures (</a:t>
-            </a:r>
-            <a:r>
-              <a:rPr kumimoji="1" lang="en-US" altLang="ja-JP" sz="1700" kern="1200" dirty="0" err="1" smtClean="0">
-                <a:solidFill>
-                  <a:schemeClr val="tx1"/>
-                </a:solidFill>
-                <a:latin typeface="+mn-lt"/>
-                <a:ea typeface="+mn-ea"/>
-                <a:cs typeface="+mn-cs"/>
-              </a:rPr>
-              <a:t>permethylated</a:t>
-            </a:r>
+              <a:t>G68004TY	</a:t>
+            </a:r>
+          </a:p>
+          <a:p>
             <a:r>
               <a:rPr kumimoji="1" lang="en-US" altLang="ja-JP" sz="1700" kern="1200" dirty="0" smtClean="0">
                 <a:solidFill>
@@ -893,19 +848,10 @@
                 <a:ea typeface="+mn-ea"/>
                 <a:cs typeface="+mn-cs"/>
               </a:rPr>
-              <a:t>/ </a:t>
-            </a:r>
-            <a:r>
-              <a:rPr kumimoji="1" lang="en-US" altLang="ja-JP" sz="1700" kern="1200" dirty="0" err="1" smtClean="0">
-                <a:solidFill>
-                  <a:schemeClr val="tx1"/>
-                </a:solidFill>
-                <a:latin typeface="+mn-lt"/>
-                <a:ea typeface="+mn-ea"/>
-                <a:cs typeface="+mn-cs"/>
-              </a:rPr>
-              <a:t>peracetylated</a:t>
-            </a:r>
+              <a:t>G55220VL	</a:t>
+            </a:r>
+          </a:p>
+          <a:p>
             <a:r>
               <a:rPr kumimoji="1" lang="en-US" altLang="ja-JP" sz="1700" kern="1200" dirty="0" smtClean="0">
                 <a:solidFill>
@@ -915,11 +861,11 @@
                 <a:ea typeface="+mn-ea"/>
                 <a:cs typeface="+mn-cs"/>
               </a:rPr>
-              <a:t>)</a:t>
-            </a:r>
-          </a:p>
-          <a:p>
-            <a:endParaRPr kumimoji="1" lang="ja-JP" altLang="en-US" dirty="0"/>
+              <a:t>G43547MI	</a:t>
+            </a:r>
+          </a:p>
+          <a:p>
+            <a:endParaRPr kumimoji="1" lang="en-US" altLang="ja-JP" dirty="0" smtClean="0"/>
           </a:p>
         </p:txBody>
       </p:sp>
@@ -940,7 +886,7 @@
           <a:p>
             <a:fld id="{B7A085AE-BE5F-794B-9BDA-88D91522557F}" type="slidenum">
               <a:rPr kumimoji="1" lang="ja-JP" altLang="en-US" smtClean="0"/>
-              <a:t>12</a:t>
+              <a:t>11</a:t>
             </a:fld>
             <a:endParaRPr kumimoji="1" lang="ja-JP" altLang="en-US"/>
           </a:p>
@@ -949,7 +895,7 @@
     </p:spTree>
     <p:extLst>
       <p:ext uri="{BB962C8B-B14F-4D97-AF65-F5344CB8AC3E}">
-        <p14:creationId xmlns:p14="http://schemas.microsoft.com/office/powerpoint/2010/main" val="3242507236"/>
+        <p14:creationId xmlns:p14="http://schemas.microsoft.com/office/powerpoint/2010/main" val="949230189"/>
       </p:ext>
     </p:extLst>
   </p:cSld>
@@ -1157,7 +1103,7 @@
           <a:p>
             <a:fld id="{B7A085AE-BE5F-794B-9BDA-88D91522557F}" type="slidenum">
               <a:rPr kumimoji="1" lang="ja-JP" altLang="en-US" smtClean="0"/>
-              <a:t>13</a:t>
+              <a:t>12</a:t>
             </a:fld>
             <a:endParaRPr kumimoji="1" lang="ja-JP" altLang="en-US"/>
           </a:p>
@@ -1220,6 +1166,223 @@
           <a:bodyPr/>
           <a:lstStyle/>
           <a:p>
+            <a:r>
+              <a:rPr kumimoji="1" lang="en-US" altLang="ja-JP" dirty="0" smtClean="0"/>
+              <a:t>Accession Number   </a:t>
+            </a:r>
+            <a:r>
+              <a:rPr kumimoji="1" lang="en-US" altLang="ja-JP" dirty="0" err="1" smtClean="0"/>
+              <a:t>Glytoucan</a:t>
+            </a:r>
+            <a:r>
+              <a:rPr kumimoji="1" lang="en-US" altLang="ja-JP" baseline="0" dirty="0" smtClean="0"/>
+              <a:t> URL </a:t>
+            </a:r>
+            <a:r>
+              <a:rPr kumimoji="1" lang="en-US" altLang="ja-JP" baseline="0" dirty="0" err="1" smtClean="0"/>
+              <a:t>has_primary_id</a:t>
+            </a:r>
+            <a:r>
+              <a:rPr kumimoji="1" lang="en-US" altLang="ja-JP" baseline="0" dirty="0" smtClean="0"/>
+              <a:t>   </a:t>
+            </a:r>
+            <a:r>
+              <a:rPr kumimoji="1" lang="en-US" altLang="ja-JP" baseline="0" dirty="0" err="1" smtClean="0"/>
+              <a:t>is_subsumed_by</a:t>
+            </a:r>
+            <a:r>
+              <a:rPr kumimoji="1" lang="en-US" altLang="ja-JP" baseline="0" dirty="0" smtClean="0"/>
+              <a:t>    </a:t>
+            </a:r>
+            <a:r>
+              <a:rPr kumimoji="1" lang="en-US" altLang="ja-JP" baseline="0" dirty="0" err="1" smtClean="0"/>
+              <a:t>is_linkage_isomer</a:t>
+            </a:r>
+            <a:r>
+              <a:rPr kumimoji="1" lang="en-US" altLang="ja-JP" baseline="0" dirty="0" smtClean="0"/>
+              <a:t>  </a:t>
+            </a:r>
+            <a:r>
+              <a:rPr kumimoji="1" lang="en-US" altLang="ja-JP" baseline="0" dirty="0" err="1" smtClean="0"/>
+              <a:t>is_substructure</a:t>
+            </a:r>
+            <a:r>
+              <a:rPr kumimoji="1" lang="en-US" altLang="ja-JP" baseline="0" dirty="0" smtClean="0"/>
+              <a:t>   </a:t>
+            </a:r>
+            <a:r>
+              <a:rPr kumimoji="1" lang="en-US" altLang="ja-JP" baseline="0" dirty="0" err="1" smtClean="0"/>
+              <a:t>is_superstructure</a:t>
+            </a:r>
+            <a:endParaRPr kumimoji="1" lang="en-US" altLang="ja-JP" baseline="0" dirty="0" smtClean="0"/>
+          </a:p>
+          <a:p>
+            <a:endParaRPr kumimoji="1" lang="en-US" altLang="ja-JP" baseline="0" dirty="0" smtClean="0"/>
+          </a:p>
+          <a:p>
+            <a:r>
+              <a:rPr kumimoji="1" lang="en-US" altLang="ja-JP" sz="1700" kern="1200" dirty="0" smtClean="0">
+                <a:solidFill>
+                  <a:schemeClr val="tx1"/>
+                </a:solidFill>
+                <a:latin typeface="+mn-lt"/>
+                <a:ea typeface="+mn-ea"/>
+                <a:cs typeface="+mn-cs"/>
+              </a:rPr>
+              <a:t>native and </a:t>
+            </a:r>
+            <a:r>
+              <a:rPr kumimoji="1" lang="en-US" altLang="ja-JP" sz="1700" kern="1200" dirty="0" err="1" smtClean="0">
+                <a:solidFill>
+                  <a:schemeClr val="tx1"/>
+                </a:solidFill>
+                <a:latin typeface="+mn-lt"/>
+                <a:ea typeface="+mn-ea"/>
+                <a:cs typeface="+mn-cs"/>
+              </a:rPr>
+              <a:t>derivatized</a:t>
+            </a:r>
+            <a:r>
+              <a:rPr kumimoji="1" lang="en-US" altLang="ja-JP" sz="1700" kern="1200" dirty="0" smtClean="0">
+                <a:solidFill>
+                  <a:schemeClr val="tx1"/>
+                </a:solidFill>
+                <a:latin typeface="+mn-lt"/>
+                <a:ea typeface="+mn-ea"/>
+                <a:cs typeface="+mn-cs"/>
+              </a:rPr>
+              <a:t> structures (</a:t>
+            </a:r>
+            <a:r>
+              <a:rPr kumimoji="1" lang="en-US" altLang="ja-JP" sz="1700" kern="1200" dirty="0" err="1" smtClean="0">
+                <a:solidFill>
+                  <a:schemeClr val="tx1"/>
+                </a:solidFill>
+                <a:latin typeface="+mn-lt"/>
+                <a:ea typeface="+mn-ea"/>
+                <a:cs typeface="+mn-cs"/>
+              </a:rPr>
+              <a:t>permethylated</a:t>
+            </a:r>
+            <a:r>
+              <a:rPr kumimoji="1" lang="en-US" altLang="ja-JP" sz="1700" kern="1200" dirty="0" smtClean="0">
+                <a:solidFill>
+                  <a:schemeClr val="tx1"/>
+                </a:solidFill>
+                <a:latin typeface="+mn-lt"/>
+                <a:ea typeface="+mn-ea"/>
+                <a:cs typeface="+mn-cs"/>
+              </a:rPr>
+              <a:t>/ </a:t>
+            </a:r>
+            <a:r>
+              <a:rPr kumimoji="1" lang="en-US" altLang="ja-JP" sz="1700" kern="1200" dirty="0" err="1" smtClean="0">
+                <a:solidFill>
+                  <a:schemeClr val="tx1"/>
+                </a:solidFill>
+                <a:latin typeface="+mn-lt"/>
+                <a:ea typeface="+mn-ea"/>
+                <a:cs typeface="+mn-cs"/>
+              </a:rPr>
+              <a:t>peracetylated</a:t>
+            </a:r>
+            <a:r>
+              <a:rPr kumimoji="1" lang="en-US" altLang="ja-JP" sz="1700" kern="1200" dirty="0" smtClean="0">
+                <a:solidFill>
+                  <a:schemeClr val="tx1"/>
+                </a:solidFill>
+                <a:latin typeface="+mn-lt"/>
+                <a:ea typeface="+mn-ea"/>
+                <a:cs typeface="+mn-cs"/>
+              </a:rPr>
+              <a:t>)</a:t>
+            </a:r>
+          </a:p>
+          <a:p>
+            <a:endParaRPr kumimoji="1" lang="ja-JP" altLang="en-US" dirty="0"/>
+          </a:p>
+        </p:txBody>
+      </p:sp>
+      <p:sp>
+        <p:nvSpPr>
+          <p:cNvPr id="4" name="スライド番号プレースホルダー 3"/>
+          <p:cNvSpPr>
+            <a:spLocks noGrp="1"/>
+          </p:cNvSpPr>
+          <p:nvPr>
+            <p:ph type="sldNum" sz="quarter" idx="10"/>
+          </p:nvPr>
+        </p:nvSpPr>
+        <p:spPr/>
+        <p:txBody>
+          <a:bodyPr/>
+          <a:lstStyle/>
+          <a:p>
+            <a:fld id="{B7A085AE-BE5F-794B-9BDA-88D91522557F}" type="slidenum">
+              <a:rPr kumimoji="1" lang="ja-JP" altLang="en-US" smtClean="0"/>
+              <a:t>13</a:t>
+            </a:fld>
+            <a:endParaRPr kumimoji="1" lang="ja-JP" altLang="en-US"/>
+          </a:p>
+        </p:txBody>
+      </p:sp>
+    </p:spTree>
+    <p:extLst>
+      <p:ext uri="{BB962C8B-B14F-4D97-AF65-F5344CB8AC3E}">
+        <p14:creationId xmlns:p14="http://schemas.microsoft.com/office/powerpoint/2010/main" val="3242507236"/>
+      </p:ext>
+    </p:extLst>
+  </p:cSld>
+  <p:clrMapOvr>
+    <a:masterClrMapping/>
+  </p:clrMapOvr>
+</p:notes>
+</file>
+
+<file path=ppt/notesSlides/notesSlide13.xml><?xml version="1.0" encoding="utf-8"?>
+<p:notes xmlns:a="http://schemas.openxmlformats.org/drawingml/2006/main" xmlns:r="http://schemas.openxmlformats.org/officeDocument/2006/relationships" xmlns:p="http://schemas.openxmlformats.org/presentationml/2006/main">
+  <p:cSld>
+    <p:spTree>
+      <p:nvGrpSpPr>
+        <p:cNvPr id="1" name=""/>
+        <p:cNvGrpSpPr/>
+        <p:nvPr/>
+      </p:nvGrpSpPr>
+      <p:grpSpPr>
+        <a:xfrm>
+          <a:off x="0" y="0"/>
+          <a:ext cx="0" cy="0"/>
+          <a:chOff x="0" y="0"/>
+          <a:chExt cx="0" cy="0"/>
+        </a:xfrm>
+      </p:grpSpPr>
+      <p:sp>
+        <p:nvSpPr>
+          <p:cNvPr id="2" name="スライド イメージ プレースホルダー 1"/>
+          <p:cNvSpPr>
+            <a:spLocks noGrp="1" noRot="1" noChangeAspect="1"/>
+          </p:cNvSpPr>
+          <p:nvPr>
+            <p:ph type="sldImg"/>
+          </p:nvPr>
+        </p:nvSpPr>
+        <p:spPr/>
+      </p:sp>
+      <p:sp>
+        <p:nvSpPr>
+          <p:cNvPr id="3" name="ノート プレースホルダー 2"/>
+          <p:cNvSpPr>
+            <a:spLocks noGrp="1"/>
+          </p:cNvSpPr>
+          <p:nvPr>
+            <p:ph type="body" idx="1"/>
+          </p:nvPr>
+        </p:nvSpPr>
+        <p:spPr/>
+        <p:txBody>
+          <a:bodyPr/>
+          <a:lstStyle/>
+          <a:p>
             <a:endParaRPr kumimoji="1" lang="ja-JP" altLang="en-US" dirty="0"/>
           </a:p>
         </p:txBody>
@@ -1477,7 +1640,7 @@
           <a:p>
             <a:fld id="{B7A085AE-BE5F-794B-9BDA-88D91522557F}" type="slidenum">
               <a:rPr kumimoji="1" lang="ja-JP" altLang="en-US" smtClean="0"/>
-              <a:t>3</a:t>
+              <a:t>2</a:t>
             </a:fld>
             <a:endParaRPr kumimoji="1" lang="ja-JP" altLang="en-US"/>
           </a:p>
@@ -1713,7 +1876,7 @@
           <a:p>
             <a:fld id="{B7A085AE-BE5F-794B-9BDA-88D91522557F}" type="slidenum">
               <a:rPr kumimoji="1" lang="ja-JP" altLang="en-US" smtClean="0"/>
-              <a:t>4</a:t>
+              <a:t>3</a:t>
             </a:fld>
             <a:endParaRPr kumimoji="1" lang="ja-JP" altLang="en-US"/>
           </a:p>
@@ -1949,7 +2112,7 @@
           <a:p>
             <a:fld id="{B7A085AE-BE5F-794B-9BDA-88D91522557F}" type="slidenum">
               <a:rPr kumimoji="1" lang="ja-JP" altLang="en-US" smtClean="0"/>
-              <a:t>5</a:t>
+              <a:t>4</a:t>
             </a:fld>
             <a:endParaRPr kumimoji="1" lang="ja-JP" altLang="en-US"/>
           </a:p>
@@ -2185,7 +2348,7 @@
           <a:p>
             <a:fld id="{B7A085AE-BE5F-794B-9BDA-88D91522557F}" type="slidenum">
               <a:rPr kumimoji="1" lang="ja-JP" altLang="en-US" smtClean="0"/>
-              <a:t>6</a:t>
+              <a:t>5</a:t>
             </a:fld>
             <a:endParaRPr kumimoji="1" lang="ja-JP" altLang="en-US"/>
           </a:p>
@@ -2421,7 +2584,7 @@
           <a:p>
             <a:fld id="{B7A085AE-BE5F-794B-9BDA-88D91522557F}" type="slidenum">
               <a:rPr kumimoji="1" lang="ja-JP" altLang="en-US" smtClean="0"/>
-              <a:t>7</a:t>
+              <a:t>6</a:t>
             </a:fld>
             <a:endParaRPr kumimoji="1" lang="ja-JP" altLang="en-US"/>
           </a:p>
@@ -2657,7 +2820,7 @@
           <a:p>
             <a:fld id="{B7A085AE-BE5F-794B-9BDA-88D91522557F}" type="slidenum">
               <a:rPr kumimoji="1" lang="ja-JP" altLang="en-US" smtClean="0"/>
-              <a:t>8</a:t>
+              <a:t>7</a:t>
             </a:fld>
             <a:endParaRPr kumimoji="1" lang="ja-JP" altLang="en-US"/>
           </a:p>
@@ -2721,17 +2884,157 @@
           <a:lstStyle/>
           <a:p>
             <a:r>
+              <a:rPr kumimoji="1" lang="en-US" altLang="ja-JP" dirty="0" smtClean="0"/>
+              <a:t>Accession Number   </a:t>
+            </a:r>
+            <a:r>
               <a:rPr kumimoji="1" lang="en-US" altLang="ja-JP" dirty="0" err="1" smtClean="0"/>
+              <a:t>Glytoucan</a:t>
+            </a:r>
+            <a:r>
+              <a:rPr kumimoji="1" lang="en-US" altLang="ja-JP" baseline="0" dirty="0" smtClean="0"/>
+              <a:t> URL </a:t>
+            </a:r>
+            <a:r>
+              <a:rPr kumimoji="1" lang="en-US" altLang="ja-JP" baseline="0" dirty="0" err="1" smtClean="0"/>
+              <a:t>has_primary_id</a:t>
+            </a:r>
+            <a:r>
+              <a:rPr kumimoji="1" lang="en-US" altLang="ja-JP" baseline="0" dirty="0" smtClean="0"/>
+              <a:t>   </a:t>
+            </a:r>
+            <a:r>
+              <a:rPr kumimoji="1" lang="en-US" altLang="ja-JP" baseline="0" dirty="0" err="1" smtClean="0"/>
+              <a:t>is_subsumed_by</a:t>
+            </a:r>
+            <a:r>
+              <a:rPr kumimoji="1" lang="en-US" altLang="ja-JP" baseline="0" dirty="0" smtClean="0"/>
+              <a:t>    </a:t>
+            </a:r>
+            <a:r>
+              <a:rPr kumimoji="1" lang="en-US" altLang="ja-JP" baseline="0" dirty="0" err="1" smtClean="0"/>
+              <a:t>is_linkage_isomer</a:t>
+            </a:r>
+            <a:r>
+              <a:rPr kumimoji="1" lang="en-US" altLang="ja-JP" baseline="0" dirty="0" smtClean="0"/>
+              <a:t>  </a:t>
+            </a:r>
+            <a:r>
+              <a:rPr kumimoji="1" lang="en-US" altLang="ja-JP" baseline="0" dirty="0" err="1" smtClean="0"/>
               <a:t>is_substructure</a:t>
             </a:r>
             <a:r>
-              <a:rPr kumimoji="1" lang="en-US" altLang="ja-JP" dirty="0" smtClean="0"/>
-              <a:t>  Saccharide  </a:t>
-            </a:r>
-            <a:r>
-              <a:rPr kumimoji="1" lang="en-US" altLang="ja-JP" dirty="0" err="1" smtClean="0"/>
+              <a:rPr kumimoji="1" lang="en-US" altLang="ja-JP" baseline="0" dirty="0" smtClean="0"/>
+              <a:t>   </a:t>
+            </a:r>
+            <a:r>
+              <a:rPr kumimoji="1" lang="en-US" altLang="ja-JP" baseline="0" dirty="0" err="1" smtClean="0"/>
               <a:t>is_superstructure</a:t>
             </a:r>
+            <a:r>
+              <a:rPr kumimoji="1" lang="en-US" altLang="ja-JP" baseline="0" dirty="0" smtClean="0"/>
+              <a:t>   </a:t>
+            </a:r>
+            <a:r>
+              <a:rPr kumimoji="1" lang="en-US" altLang="ja-JP" baseline="0" dirty="0" err="1" smtClean="0"/>
+              <a:t>glyco</a:t>
+            </a:r>
+            <a:r>
+              <a:rPr kumimoji="1" lang="en-US" altLang="ja-JP" baseline="0" dirty="0" smtClean="0"/>
+              <a:t> ontology + </a:t>
+            </a:r>
+            <a:r>
+              <a:rPr kumimoji="1" lang="en-US" altLang="ja-JP" baseline="0" dirty="0" err="1" smtClean="0"/>
+              <a:t>glytoucan</a:t>
+            </a:r>
+            <a:r>
+              <a:rPr kumimoji="1" lang="en-US" altLang="ja-JP" baseline="0" dirty="0" smtClean="0"/>
+              <a:t> ontology</a:t>
+            </a:r>
+          </a:p>
+          <a:p>
+            <a:endParaRPr kumimoji="1" lang="en-US" altLang="ja-JP" baseline="0" dirty="0" smtClean="0"/>
+          </a:p>
+          <a:p>
+            <a:r>
+              <a:rPr kumimoji="1" lang="en-US" altLang="ja-JP" sz="1700" kern="1200" dirty="0" smtClean="0">
+                <a:solidFill>
+                  <a:schemeClr val="tx1"/>
+                </a:solidFill>
+                <a:latin typeface="+mn-lt"/>
+                <a:ea typeface="+mn-ea"/>
+                <a:cs typeface="+mn-cs"/>
+              </a:rPr>
+              <a:t>native and </a:t>
+            </a:r>
+            <a:r>
+              <a:rPr kumimoji="1" lang="en-US" altLang="ja-JP" sz="1700" kern="1200" dirty="0" err="1" smtClean="0">
+                <a:solidFill>
+                  <a:schemeClr val="tx1"/>
+                </a:solidFill>
+                <a:latin typeface="+mn-lt"/>
+                <a:ea typeface="+mn-ea"/>
+                <a:cs typeface="+mn-cs"/>
+              </a:rPr>
+              <a:t>derivatized</a:t>
+            </a:r>
+            <a:r>
+              <a:rPr kumimoji="1" lang="en-US" altLang="ja-JP" sz="1700" kern="1200" dirty="0" smtClean="0">
+                <a:solidFill>
+                  <a:schemeClr val="tx1"/>
+                </a:solidFill>
+                <a:latin typeface="+mn-lt"/>
+                <a:ea typeface="+mn-ea"/>
+                <a:cs typeface="+mn-cs"/>
+              </a:rPr>
+              <a:t> structures (</a:t>
+            </a:r>
+            <a:r>
+              <a:rPr kumimoji="1" lang="en-US" altLang="ja-JP" sz="1700" kern="1200" dirty="0" err="1" smtClean="0">
+                <a:solidFill>
+                  <a:schemeClr val="tx1"/>
+                </a:solidFill>
+                <a:latin typeface="+mn-lt"/>
+                <a:ea typeface="+mn-ea"/>
+                <a:cs typeface="+mn-cs"/>
+              </a:rPr>
+              <a:t>permethylated</a:t>
+            </a:r>
+            <a:r>
+              <a:rPr kumimoji="1" lang="en-US" altLang="ja-JP" sz="1700" kern="1200" dirty="0" smtClean="0">
+                <a:solidFill>
+                  <a:schemeClr val="tx1"/>
+                </a:solidFill>
+                <a:latin typeface="+mn-lt"/>
+                <a:ea typeface="+mn-ea"/>
+                <a:cs typeface="+mn-cs"/>
+              </a:rPr>
+              <a:t>/ </a:t>
+            </a:r>
+            <a:r>
+              <a:rPr kumimoji="1" lang="en-US" altLang="ja-JP" sz="1700" kern="1200" dirty="0" err="1" smtClean="0">
+                <a:solidFill>
+                  <a:schemeClr val="tx1"/>
+                </a:solidFill>
+                <a:latin typeface="+mn-lt"/>
+                <a:ea typeface="+mn-ea"/>
+                <a:cs typeface="+mn-cs"/>
+              </a:rPr>
+              <a:t>peracetylated</a:t>
+            </a:r>
+            <a:r>
+              <a:rPr kumimoji="1" lang="en-US" altLang="ja-JP" sz="1700" kern="1200" dirty="0" smtClean="0">
+                <a:solidFill>
+                  <a:schemeClr val="tx1"/>
+                </a:solidFill>
+                <a:latin typeface="+mn-lt"/>
+                <a:ea typeface="+mn-ea"/>
+                <a:cs typeface="+mn-cs"/>
+              </a:rPr>
+              <a:t>)</a:t>
+            </a:r>
+          </a:p>
+          <a:p>
             <a:endParaRPr kumimoji="1" lang="ja-JP" altLang="en-US" dirty="0"/>
           </a:p>
         </p:txBody>
@@ -2753,7 +3056,7 @@
           <a:p>
             <a:fld id="{B7A085AE-BE5F-794B-9BDA-88D91522557F}" type="slidenum">
               <a:rPr kumimoji="1" lang="ja-JP" altLang="en-US" smtClean="0"/>
-              <a:t>10</a:t>
+              <a:t>8</a:t>
             </a:fld>
             <a:endParaRPr kumimoji="1" lang="ja-JP" altLang="en-US"/>
           </a:p>
@@ -2762,7 +3065,7 @@
     </p:spTree>
     <p:extLst>
       <p:ext uri="{BB962C8B-B14F-4D97-AF65-F5344CB8AC3E}">
-        <p14:creationId xmlns:p14="http://schemas.microsoft.com/office/powerpoint/2010/main" val="294545991"/>
+        <p14:creationId xmlns:p14="http://schemas.microsoft.com/office/powerpoint/2010/main" val="3242507236"/>
       </p:ext>
     </p:extLst>
   </p:cSld>
@@ -2818,84 +3121,17 @@
           <a:p>
             <a:r>
               <a:rPr kumimoji="1" lang="en-US" altLang="ja-JP" dirty="0" err="1" smtClean="0"/>
-              <a:t>has_motif</a:t>
-            </a:r>
-            <a:r>
-              <a:rPr kumimoji="1" lang="en-US" altLang="ja-JP" baseline="0" dirty="0" smtClean="0"/>
-              <a:t>   </a:t>
-            </a:r>
-            <a:r>
-              <a:rPr kumimoji="1" lang="en-US" altLang="ja-JP" baseline="0" dirty="0" err="1" smtClean="0"/>
-              <a:t>is_linkage_isomer</a:t>
-            </a:r>
-            <a:r>
-              <a:rPr kumimoji="1" lang="en-US" altLang="ja-JP" baseline="0" dirty="0" smtClean="0"/>
-              <a:t>  </a:t>
-            </a:r>
-          </a:p>
-          <a:p>
-            <a:endParaRPr kumimoji="1" lang="en-US" altLang="ja-JP" baseline="0" dirty="0" smtClean="0"/>
-          </a:p>
-          <a:p>
-            <a:r>
-              <a:rPr kumimoji="1" lang="en-US" altLang="ja-JP" baseline="0" dirty="0" smtClean="0"/>
-              <a:t>G63838JW</a:t>
-            </a:r>
-          </a:p>
-          <a:p>
-            <a:r>
-              <a:rPr kumimoji="1" lang="en-US" altLang="ja-JP" sz="1700" kern="1200" dirty="0" smtClean="0">
-                <a:solidFill>
-                  <a:schemeClr val="tx1"/>
-                </a:solidFill>
-                <a:latin typeface="+mn-lt"/>
-                <a:ea typeface="+mn-ea"/>
-                <a:cs typeface="+mn-cs"/>
-              </a:rPr>
-              <a:t>G22768VO	</a:t>
-            </a:r>
-          </a:p>
-          <a:p>
-            <a:r>
-              <a:rPr kumimoji="1" lang="en-US" altLang="ja-JP" sz="1700" kern="1200" dirty="0" smtClean="0">
-                <a:solidFill>
-                  <a:schemeClr val="tx1"/>
-                </a:solidFill>
-                <a:latin typeface="+mn-lt"/>
-                <a:ea typeface="+mn-ea"/>
-                <a:cs typeface="+mn-cs"/>
-              </a:rPr>
-              <a:t>G68004TY	</a:t>
-            </a:r>
-          </a:p>
-          <a:p>
-            <a:r>
-              <a:rPr kumimoji="1" lang="en-US" altLang="ja-JP" sz="1700" kern="1200" dirty="0" smtClean="0">
-                <a:solidFill>
-                  <a:schemeClr val="tx1"/>
-                </a:solidFill>
-                <a:latin typeface="+mn-lt"/>
-                <a:ea typeface="+mn-ea"/>
-                <a:cs typeface="+mn-cs"/>
-              </a:rPr>
-              <a:t>G55220VL	</a:t>
-            </a:r>
-          </a:p>
-          <a:p>
-            <a:r>
-              <a:rPr kumimoji="1" lang="en-US" altLang="ja-JP" sz="1700" kern="1200" dirty="0" smtClean="0">
-                <a:solidFill>
-                  <a:schemeClr val="tx1"/>
-                </a:solidFill>
-                <a:latin typeface="+mn-lt"/>
-                <a:ea typeface="+mn-ea"/>
-                <a:cs typeface="+mn-cs"/>
-              </a:rPr>
-              <a:t>G43547MI	</a:t>
-            </a:r>
-          </a:p>
-          <a:p>
-            <a:endParaRPr kumimoji="1" lang="en-US" altLang="ja-JP" dirty="0" smtClean="0"/>
+              <a:t>is_substructure</a:t>
+            </a:r>
+            <a:r>
+              <a:rPr kumimoji="1" lang="en-US" altLang="ja-JP" dirty="0" smtClean="0"/>
+              <a:t>  Saccharide  </a:t>
+            </a:r>
+            <a:r>
+              <a:rPr kumimoji="1" lang="en-US" altLang="ja-JP" dirty="0" err="1" smtClean="0"/>
+              <a:t>is_superstructure</a:t>
+            </a:r>
+            <a:endParaRPr kumimoji="1" lang="ja-JP" altLang="en-US" dirty="0"/>
           </a:p>
         </p:txBody>
       </p:sp>
@@ -2916,7 +3152,7 @@
           <a:p>
             <a:fld id="{B7A085AE-BE5F-794B-9BDA-88D91522557F}" type="slidenum">
               <a:rPr kumimoji="1" lang="ja-JP" altLang="en-US" smtClean="0"/>
-              <a:t>11</a:t>
+              <a:t>10</a:t>
             </a:fld>
             <a:endParaRPr kumimoji="1" lang="ja-JP" altLang="en-US"/>
           </a:p>
@@ -2925,7 +3161,7 @@
     </p:spTree>
     <p:extLst>
       <p:ext uri="{BB962C8B-B14F-4D97-AF65-F5344CB8AC3E}">
-        <p14:creationId xmlns:p14="http://schemas.microsoft.com/office/powerpoint/2010/main" val="949230189"/>
+        <p14:creationId xmlns:p14="http://schemas.microsoft.com/office/powerpoint/2010/main" val="294545991"/>
       </p:ext>
     </p:extLst>
   </p:cSld>
@@ -3116,7 +3352,7 @@
           <a:p>
             <a:fld id="{7019C14F-8D5D-7346-A192-2A9D8B7ED511}" type="datetimeFigureOut">
               <a:rPr kumimoji="1" lang="ja-JP" altLang="en-US" smtClean="0"/>
-              <a:t>2015/07/07</a:t>
+              <a:t>16/12/08</a:t>
             </a:fld>
             <a:endParaRPr kumimoji="1" lang="ja-JP" altLang="en-US"/>
           </a:p>
@@ -3318,7 +3554,7 @@
           <a:p>
             <a:fld id="{7019C14F-8D5D-7346-A192-2A9D8B7ED511}" type="datetimeFigureOut">
               <a:rPr kumimoji="1" lang="ja-JP" altLang="en-US" smtClean="0"/>
-              <a:t>2015/07/07</a:t>
+              <a:t>16/12/08</a:t>
             </a:fld>
             <a:endParaRPr kumimoji="1" lang="ja-JP" altLang="en-US"/>
           </a:p>
@@ -3530,7 +3766,7 @@
           <a:p>
             <a:fld id="{7019C14F-8D5D-7346-A192-2A9D8B7ED511}" type="datetimeFigureOut">
               <a:rPr kumimoji="1" lang="ja-JP" altLang="en-US" smtClean="0"/>
-              <a:t>2015/07/07</a:t>
+              <a:t>16/12/08</a:t>
             </a:fld>
             <a:endParaRPr kumimoji="1" lang="ja-JP" altLang="en-US"/>
           </a:p>
@@ -3732,7 +3968,7 @@
           <a:p>
             <a:fld id="{7019C14F-8D5D-7346-A192-2A9D8B7ED511}" type="datetimeFigureOut">
               <a:rPr kumimoji="1" lang="ja-JP" altLang="en-US" smtClean="0"/>
-              <a:t>2015/07/07</a:t>
+              <a:t>16/12/08</a:t>
             </a:fld>
             <a:endParaRPr kumimoji="1" lang="ja-JP" altLang="en-US"/>
           </a:p>
@@ -3978,7 +4214,7 @@
           <a:p>
             <a:fld id="{7019C14F-8D5D-7346-A192-2A9D8B7ED511}" type="datetimeFigureOut">
               <a:rPr kumimoji="1" lang="ja-JP" altLang="en-US" smtClean="0"/>
-              <a:t>2015/07/07</a:t>
+              <a:t>16/12/08</a:t>
             </a:fld>
             <a:endParaRPr kumimoji="1" lang="ja-JP" altLang="en-US"/>
           </a:p>
@@ -4330,7 +4566,7 @@
           <a:p>
             <a:fld id="{7019C14F-8D5D-7346-A192-2A9D8B7ED511}" type="datetimeFigureOut">
               <a:rPr kumimoji="1" lang="ja-JP" altLang="en-US" smtClean="0"/>
-              <a:t>2015/07/07</a:t>
+              <a:t>16/12/08</a:t>
             </a:fld>
             <a:endParaRPr kumimoji="1" lang="ja-JP" altLang="en-US"/>
           </a:p>
@@ -4816,7 +5052,7 @@
           <a:p>
             <a:fld id="{7019C14F-8D5D-7346-A192-2A9D8B7ED511}" type="datetimeFigureOut">
               <a:rPr kumimoji="1" lang="ja-JP" altLang="en-US" smtClean="0"/>
-              <a:t>2015/07/07</a:t>
+              <a:t>16/12/08</a:t>
             </a:fld>
             <a:endParaRPr kumimoji="1" lang="ja-JP" altLang="en-US"/>
           </a:p>
@@ -4934,7 +5170,7 @@
           <a:p>
             <a:fld id="{7019C14F-8D5D-7346-A192-2A9D8B7ED511}" type="datetimeFigureOut">
               <a:rPr kumimoji="1" lang="ja-JP" altLang="en-US" smtClean="0"/>
-              <a:t>2015/07/07</a:t>
+              <a:t>16/12/08</a:t>
             </a:fld>
             <a:endParaRPr kumimoji="1" lang="ja-JP" altLang="en-US"/>
           </a:p>
@@ -5029,7 +5265,7 @@
           <a:p>
             <a:fld id="{7019C14F-8D5D-7346-A192-2A9D8B7ED511}" type="datetimeFigureOut">
               <a:rPr kumimoji="1" lang="ja-JP" altLang="en-US" smtClean="0"/>
-              <a:t>2015/07/07</a:t>
+              <a:t>16/12/08</a:t>
             </a:fld>
             <a:endParaRPr kumimoji="1" lang="ja-JP" altLang="en-US"/>
           </a:p>
@@ -5338,7 +5574,7 @@
           <a:p>
             <a:fld id="{7019C14F-8D5D-7346-A192-2A9D8B7ED511}" type="datetimeFigureOut">
               <a:rPr kumimoji="1" lang="ja-JP" altLang="en-US" smtClean="0"/>
-              <a:t>2015/07/07</a:t>
+              <a:t>16/12/08</a:t>
             </a:fld>
             <a:endParaRPr kumimoji="1" lang="ja-JP" altLang="en-US"/>
           </a:p>
@@ -5591,7 +5827,7 @@
           <a:p>
             <a:fld id="{7019C14F-8D5D-7346-A192-2A9D8B7ED511}" type="datetimeFigureOut">
               <a:rPr kumimoji="1" lang="ja-JP" altLang="en-US" smtClean="0"/>
-              <a:t>2015/07/07</a:t>
+              <a:t>16/12/08</a:t>
             </a:fld>
             <a:endParaRPr kumimoji="1" lang="ja-JP" altLang="en-US"/>
           </a:p>
@@ -5836,7 +6072,7 @@
           <a:p>
             <a:fld id="{7019C14F-8D5D-7346-A192-2A9D8B7ED511}" type="datetimeFigureOut">
               <a:rPr kumimoji="1" lang="ja-JP" altLang="en-US" smtClean="0"/>
-              <a:t>2015/07/07</a:t>
+              <a:t>16/12/08</a:t>
             </a:fld>
             <a:endParaRPr kumimoji="1" lang="ja-JP" altLang="en-US"/>
           </a:p>
@@ -6213,91 +6449,424 @@
       </p:grpSpPr>
       <p:sp>
         <p:nvSpPr>
-          <p:cNvPr id="4" name="円/楕円 3"/>
-          <p:cNvSpPr/>
-          <p:nvPr/>
-        </p:nvSpPr>
-        <p:spPr>
-          <a:xfrm>
-            <a:off x="5596244" y="1310522"/>
-            <a:ext cx="1235709" cy="898807"/>
-          </a:xfrm>
-          <a:prstGeom prst="ellipse">
-            <a:avLst/>
-          </a:prstGeom>
-        </p:spPr>
-        <p:style>
-          <a:lnRef idx="1">
-            <a:schemeClr val="accent6"/>
-          </a:lnRef>
-          <a:fillRef idx="2">
-            <a:schemeClr val="accent6"/>
-          </a:fillRef>
-          <a:effectRef idx="1">
-            <a:schemeClr val="accent6"/>
-          </a:effectRef>
-          <a:fontRef idx="minor">
-            <a:schemeClr val="dk1"/>
-          </a:fontRef>
-        </p:style>
-        <p:txBody>
-          <a:bodyPr lIns="128016" tIns="64008" rIns="128016" bIns="64008" spcCol="0" rtlCol="0" anchor="ctr"/>
-          <a:lstStyle/>
-          <a:p>
-            <a:pPr algn="ctr"/>
-            <a:endParaRPr kumimoji="1" lang="ja-JP" altLang="en-US" sz="1800" dirty="0"/>
-          </a:p>
-        </p:txBody>
-      </p:sp>
-      <p:sp>
-        <p:nvSpPr>
-          <p:cNvPr id="5" name="正方形/長方形 4"/>
-          <p:cNvSpPr/>
-          <p:nvPr/>
-        </p:nvSpPr>
-        <p:spPr>
-          <a:xfrm>
-            <a:off x="5614047" y="2641187"/>
-            <a:ext cx="1217906" cy="307777"/>
+          <p:cNvPr id="48" name="正方形/長方形 47"/>
+          <p:cNvSpPr/>
+          <p:nvPr/>
+        </p:nvSpPr>
+        <p:spPr>
+          <a:xfrm>
+            <a:off x="417680" y="160242"/>
+            <a:ext cx="4158556" cy="369332"/>
           </a:xfrm>
           <a:prstGeom prst="rect">
             <a:avLst/>
           </a:prstGeom>
         </p:spPr>
-        <p:style>
-          <a:lnRef idx="1">
-            <a:schemeClr val="accent1"/>
-          </a:lnRef>
-          <a:fillRef idx="2">
-            <a:schemeClr val="accent1"/>
-          </a:fillRef>
-          <a:effectRef idx="1">
-            <a:schemeClr val="accent1"/>
-          </a:effectRef>
-          <a:fontRef idx="minor">
-            <a:schemeClr val="dk1"/>
-          </a:fontRef>
-        </p:style>
         <p:txBody>
           <a:bodyPr wrap="square">
             <a:spAutoFit/>
           </a:bodyPr>
           <a:lstStyle/>
           <a:p>
+            <a:r>
+              <a:rPr lang="en-US" altLang="ja-JP" sz="1800" b="1" dirty="0"/>
+              <a:t>Repository </a:t>
+            </a:r>
+            <a:r>
+              <a:rPr lang="en-US" altLang="ja-JP" sz="1800" b="1" dirty="0" smtClean="0"/>
+              <a:t>Schema  ( example Glycan )</a:t>
+            </a:r>
+            <a:endParaRPr lang="ja-JP" altLang="en-US" sz="1800" b="1" dirty="0"/>
+          </a:p>
+        </p:txBody>
+      </p:sp>
+      <p:sp>
+        <p:nvSpPr>
+          <p:cNvPr id="253" name="正方形/長方形 252"/>
+          <p:cNvSpPr/>
+          <p:nvPr/>
+        </p:nvSpPr>
+        <p:spPr>
+          <a:xfrm>
+            <a:off x="360860" y="588820"/>
+            <a:ext cx="4006225" cy="400110"/>
+          </a:xfrm>
+          <a:prstGeom prst="rect">
+            <a:avLst/>
+          </a:prstGeom>
+        </p:spPr>
+        <p:style>
+          <a:lnRef idx="1">
+            <a:schemeClr val="accent4"/>
+          </a:lnRef>
+          <a:fillRef idx="2">
+            <a:schemeClr val="accent4"/>
+          </a:fillRef>
+          <a:effectRef idx="1">
+            <a:schemeClr val="accent4"/>
+          </a:effectRef>
+          <a:fontRef idx="minor">
+            <a:schemeClr val="dk1"/>
+          </a:fontRef>
+        </p:style>
+        <p:txBody>
+          <a:bodyPr wrap="none">
+            <a:spAutoFit/>
+          </a:bodyPr>
+          <a:lstStyle/>
+          <a:p>
+            <a:r>
+              <a:rPr lang="en-US" altLang="ja-JP" sz="2000" dirty="0"/>
+              <a:t> </a:t>
+            </a:r>
+            <a:r>
+              <a:rPr lang="en-US" altLang="ja-JP" sz="2000" dirty="0" err="1"/>
+              <a:t>glyco</a:t>
+            </a:r>
+            <a:r>
+              <a:rPr lang="en-US" altLang="ja-JP" sz="2000" dirty="0"/>
+              <a:t> ontology + </a:t>
+            </a:r>
+            <a:r>
+              <a:rPr lang="en-US" altLang="ja-JP" sz="2000" dirty="0" err="1"/>
+              <a:t>glytoucan</a:t>
+            </a:r>
+            <a:r>
+              <a:rPr lang="en-US" altLang="ja-JP" sz="2000" dirty="0"/>
+              <a:t> ontology</a:t>
+            </a:r>
+          </a:p>
+        </p:txBody>
+      </p:sp>
+      <p:sp>
+        <p:nvSpPr>
+          <p:cNvPr id="4" name="円/楕円 3"/>
+          <p:cNvSpPr/>
+          <p:nvPr/>
+        </p:nvSpPr>
+        <p:spPr>
+          <a:xfrm>
+            <a:off x="3168009" y="3880803"/>
+            <a:ext cx="2526147" cy="1286184"/>
+          </a:xfrm>
+          <a:prstGeom prst="ellipse">
+            <a:avLst/>
+          </a:prstGeom>
+        </p:spPr>
+        <p:style>
+          <a:lnRef idx="1">
+            <a:schemeClr val="accent6"/>
+          </a:lnRef>
+          <a:fillRef idx="2">
+            <a:schemeClr val="accent6"/>
+          </a:fillRef>
+          <a:effectRef idx="1">
+            <a:schemeClr val="accent6"/>
+          </a:effectRef>
+          <a:fontRef idx="minor">
+            <a:schemeClr val="dk1"/>
+          </a:fontRef>
+        </p:style>
+        <p:txBody>
+          <a:bodyPr lIns="128016" tIns="64008" rIns="128016" bIns="64008" spcCol="0" rtlCol="0" anchor="ctr"/>
+          <a:lstStyle/>
+          <a:p>
+            <a:pPr algn="ctr"/>
+            <a:r>
+              <a:rPr lang="en-US" altLang="ja-JP" sz="1800" dirty="0" smtClean="0"/>
+              <a:t>Saccharide</a:t>
+            </a:r>
+            <a:endParaRPr kumimoji="1" lang="ja-JP" altLang="en-US" sz="1800" dirty="0"/>
+          </a:p>
+        </p:txBody>
+      </p:sp>
+      <p:sp>
+        <p:nvSpPr>
+          <p:cNvPr id="5" name="円/楕円 4"/>
+          <p:cNvSpPr/>
+          <p:nvPr/>
+        </p:nvSpPr>
+        <p:spPr>
+          <a:xfrm>
+            <a:off x="8184102" y="5407540"/>
+            <a:ext cx="1674578" cy="933180"/>
+          </a:xfrm>
+          <a:prstGeom prst="ellipse">
+            <a:avLst/>
+          </a:prstGeom>
+        </p:spPr>
+        <p:style>
+          <a:lnRef idx="1">
+            <a:schemeClr val="accent6"/>
+          </a:lnRef>
+          <a:fillRef idx="2">
+            <a:schemeClr val="accent6"/>
+          </a:fillRef>
+          <a:effectRef idx="1">
+            <a:schemeClr val="accent6"/>
+          </a:effectRef>
+          <a:fontRef idx="minor">
+            <a:schemeClr val="dk1"/>
+          </a:fontRef>
+        </p:style>
+        <p:txBody>
+          <a:bodyPr lIns="128016" tIns="64008" rIns="128016" bIns="64008" spcCol="0" rtlCol="0" anchor="ctr"/>
+          <a:lstStyle/>
+          <a:p>
+            <a:pPr algn="ctr"/>
+            <a:r>
+              <a:rPr lang="en-US" altLang="ja-JP" sz="1400" dirty="0" smtClean="0"/>
+              <a:t>Component</a:t>
+            </a:r>
+            <a:endParaRPr kumimoji="1" lang="ja-JP" altLang="en-US" sz="1400" dirty="0"/>
+          </a:p>
+        </p:txBody>
+      </p:sp>
+      <p:sp>
+        <p:nvSpPr>
+          <p:cNvPr id="8" name="円/楕円 7"/>
+          <p:cNvSpPr/>
+          <p:nvPr/>
+        </p:nvSpPr>
+        <p:spPr>
+          <a:xfrm>
+            <a:off x="1136886" y="7059827"/>
+            <a:ext cx="2159231" cy="969098"/>
+          </a:xfrm>
+          <a:prstGeom prst="ellipse">
+            <a:avLst/>
+          </a:prstGeom>
+        </p:spPr>
+        <p:style>
+          <a:lnRef idx="1">
+            <a:schemeClr val="accent6"/>
+          </a:lnRef>
+          <a:fillRef idx="2">
+            <a:schemeClr val="accent6"/>
+          </a:fillRef>
+          <a:effectRef idx="1">
+            <a:schemeClr val="accent6"/>
+          </a:effectRef>
+          <a:fontRef idx="minor">
+            <a:schemeClr val="dk1"/>
+          </a:fontRef>
+        </p:style>
+        <p:txBody>
+          <a:bodyPr lIns="128016" tIns="64008" rIns="128016" bIns="64008" spcCol="0" rtlCol="0" anchor="ctr"/>
+          <a:lstStyle/>
+          <a:p>
+            <a:pPr algn="ctr"/>
+            <a:r>
+              <a:rPr lang="en-US" altLang="ja-JP" sz="1400" dirty="0" smtClean="0"/>
+              <a:t>Glycan Motif</a:t>
+            </a:r>
+            <a:endParaRPr kumimoji="1" lang="ja-JP" altLang="en-US" sz="1400" dirty="0"/>
+          </a:p>
+        </p:txBody>
+      </p:sp>
+      <p:sp>
+        <p:nvSpPr>
+          <p:cNvPr id="12" name="円/楕円 11"/>
+          <p:cNvSpPr/>
+          <p:nvPr/>
+        </p:nvSpPr>
+        <p:spPr>
+          <a:xfrm>
+            <a:off x="7713617" y="7059827"/>
+            <a:ext cx="1627320" cy="666557"/>
+          </a:xfrm>
+          <a:prstGeom prst="ellipse">
+            <a:avLst/>
+          </a:prstGeom>
+        </p:spPr>
+        <p:style>
+          <a:lnRef idx="1">
+            <a:schemeClr val="accent6"/>
+          </a:lnRef>
+          <a:fillRef idx="2">
+            <a:schemeClr val="accent6"/>
+          </a:fillRef>
+          <a:effectRef idx="1">
+            <a:schemeClr val="accent6"/>
+          </a:effectRef>
+          <a:fontRef idx="minor">
+            <a:schemeClr val="dk1"/>
+          </a:fontRef>
+        </p:style>
+        <p:txBody>
+          <a:bodyPr rtlCol="0" anchor="ctr"/>
+          <a:lstStyle/>
+          <a:p>
+            <a:pPr algn="ctr"/>
+            <a:r>
+              <a:rPr lang="en-US" altLang="ja-JP" sz="1400" dirty="0" smtClean="0"/>
+              <a:t>Image</a:t>
+            </a:r>
+            <a:endParaRPr kumimoji="1" lang="ja-JP" altLang="en-US" sz="1400" dirty="0"/>
+          </a:p>
+        </p:txBody>
+      </p:sp>
+      <p:cxnSp>
+        <p:nvCxnSpPr>
+          <p:cNvPr id="14" name="直線矢印コネクタ 13"/>
+          <p:cNvCxnSpPr>
+            <a:stCxn id="4" idx="5"/>
+            <a:endCxn id="12" idx="1"/>
+          </p:cNvCxnSpPr>
+          <p:nvPr/>
+        </p:nvCxnSpPr>
+        <p:spPr>
+          <a:xfrm>
+            <a:off x="5324210" y="4978630"/>
+            <a:ext cx="2627722" cy="2178812"/>
+          </a:xfrm>
+          <a:prstGeom prst="straightConnector1">
+            <a:avLst/>
+          </a:prstGeom>
+          <a:ln>
+            <a:tailEnd type="arrow"/>
+          </a:ln>
+        </p:spPr>
+        <p:style>
+          <a:lnRef idx="2">
+            <a:schemeClr val="accent1"/>
+          </a:lnRef>
+          <a:fillRef idx="0">
+            <a:schemeClr val="accent1"/>
+          </a:fillRef>
+          <a:effectRef idx="1">
+            <a:schemeClr val="accent1"/>
+          </a:effectRef>
+          <a:fontRef idx="minor">
+            <a:schemeClr val="tx1"/>
+          </a:fontRef>
+        </p:style>
+      </p:cxnSp>
+      <p:cxnSp>
+        <p:nvCxnSpPr>
+          <p:cNvPr id="16" name="直線矢印コネクタ 15"/>
+          <p:cNvCxnSpPr>
+            <a:stCxn id="4" idx="3"/>
+            <a:endCxn id="8" idx="0"/>
+          </p:cNvCxnSpPr>
+          <p:nvPr/>
+        </p:nvCxnSpPr>
+        <p:spPr>
+          <a:xfrm flipH="1">
+            <a:off x="2216502" y="4978630"/>
+            <a:ext cx="1321453" cy="2081197"/>
+          </a:xfrm>
+          <a:prstGeom prst="straightConnector1">
+            <a:avLst/>
+          </a:prstGeom>
+          <a:ln>
+            <a:tailEnd type="arrow"/>
+          </a:ln>
+        </p:spPr>
+        <p:style>
+          <a:lnRef idx="2">
+            <a:schemeClr val="accent1"/>
+          </a:lnRef>
+          <a:fillRef idx="0">
+            <a:schemeClr val="accent1"/>
+          </a:fillRef>
+          <a:effectRef idx="1">
+            <a:schemeClr val="accent1"/>
+          </a:effectRef>
+          <a:fontRef idx="minor">
+            <a:schemeClr val="tx1"/>
+          </a:fontRef>
+        </p:style>
+      </p:cxnSp>
+      <p:cxnSp>
+        <p:nvCxnSpPr>
+          <p:cNvPr id="20" name="直線矢印コネクタ 19"/>
+          <p:cNvCxnSpPr>
+            <a:stCxn id="4" idx="6"/>
+            <a:endCxn id="5" idx="1"/>
+          </p:cNvCxnSpPr>
+          <p:nvPr/>
+        </p:nvCxnSpPr>
+        <p:spPr>
+          <a:xfrm>
+            <a:off x="5694156" y="4523895"/>
+            <a:ext cx="2735182" cy="1020306"/>
+          </a:xfrm>
+          <a:prstGeom prst="straightConnector1">
+            <a:avLst/>
+          </a:prstGeom>
+          <a:ln>
+            <a:tailEnd type="arrow"/>
+          </a:ln>
+        </p:spPr>
+        <p:style>
+          <a:lnRef idx="2">
+            <a:schemeClr val="accent1"/>
+          </a:lnRef>
+          <a:fillRef idx="0">
+            <a:schemeClr val="accent1"/>
+          </a:fillRef>
+          <a:effectRef idx="1">
+            <a:schemeClr val="accent1"/>
+          </a:effectRef>
+          <a:fontRef idx="minor">
+            <a:schemeClr val="tx1"/>
+          </a:fontRef>
+        </p:style>
+      </p:cxnSp>
+      <p:sp>
+        <p:nvSpPr>
+          <p:cNvPr id="72" name="正方形/長方形 71"/>
+          <p:cNvSpPr/>
+          <p:nvPr/>
+        </p:nvSpPr>
+        <p:spPr>
+          <a:xfrm>
+            <a:off x="2506276" y="5720241"/>
+            <a:ext cx="1428797" cy="307777"/>
+          </a:xfrm>
+          <a:prstGeom prst="rect">
+            <a:avLst/>
+          </a:prstGeom>
+        </p:spPr>
+        <p:style>
+          <a:lnRef idx="1">
+            <a:schemeClr val="accent1"/>
+          </a:lnRef>
+          <a:fillRef idx="2">
+            <a:schemeClr val="accent1"/>
+          </a:fillRef>
+          <a:effectRef idx="1">
+            <a:schemeClr val="accent1"/>
+          </a:effectRef>
+          <a:fontRef idx="minor">
+            <a:schemeClr val="dk1"/>
+          </a:fontRef>
+        </p:style>
+        <p:txBody>
+          <a:bodyPr wrap="none">
+            <a:spAutoFit/>
+          </a:bodyPr>
+          <a:lstStyle/>
+          <a:p>
+            <a:r>
+              <a:rPr lang="en-US" altLang="ja-JP" sz="1400" dirty="0" err="1" smtClean="0"/>
+              <a:t>glycan:has_motif</a:t>
+            </a:r>
             <a:endParaRPr lang="ja-JP" altLang="en-US" sz="1400" dirty="0"/>
           </a:p>
         </p:txBody>
       </p:sp>
       <p:sp>
         <p:nvSpPr>
-          <p:cNvPr id="6" name="正方形/長方形 5"/>
-          <p:cNvSpPr/>
-          <p:nvPr/>
-        </p:nvSpPr>
-        <p:spPr>
-          <a:xfrm>
-            <a:off x="5614047" y="3256741"/>
-            <a:ext cx="1217906" cy="307777"/>
+          <p:cNvPr id="89" name="正方形/長方形 88"/>
+          <p:cNvSpPr/>
+          <p:nvPr/>
+        </p:nvSpPr>
+        <p:spPr>
+          <a:xfrm>
+            <a:off x="6474407" y="6287401"/>
+            <a:ext cx="1480343" cy="307777"/>
           </a:xfrm>
           <a:prstGeom prst="rect">
             <a:avLst/>
@@ -6305,6 +6874,213 @@
         </p:spPr>
         <p:style>
           <a:lnRef idx="1">
+            <a:schemeClr val="accent1"/>
+          </a:lnRef>
+          <a:fillRef idx="2">
+            <a:schemeClr val="accent1"/>
+          </a:fillRef>
+          <a:effectRef idx="1">
+            <a:schemeClr val="accent1"/>
+          </a:effectRef>
+          <a:fontRef idx="minor">
+            <a:schemeClr val="dk1"/>
+          </a:fontRef>
+        </p:style>
+        <p:txBody>
+          <a:bodyPr wrap="none">
+            <a:spAutoFit/>
+          </a:bodyPr>
+          <a:lstStyle/>
+          <a:p>
+            <a:r>
+              <a:rPr lang="en-US" altLang="ja-JP" sz="1400" dirty="0" err="1" smtClean="0"/>
+              <a:t>glycan:has_image</a:t>
+            </a:r>
+            <a:endParaRPr lang="ja-JP" altLang="en-US" sz="1400" dirty="0"/>
+          </a:p>
+        </p:txBody>
+      </p:sp>
+      <p:sp>
+        <p:nvSpPr>
+          <p:cNvPr id="95" name="正方形/長方形 94"/>
+          <p:cNvSpPr/>
+          <p:nvPr/>
+        </p:nvSpPr>
+        <p:spPr>
+          <a:xfrm>
+            <a:off x="6125658" y="4965959"/>
+            <a:ext cx="1877024" cy="307777"/>
+          </a:xfrm>
+          <a:prstGeom prst="rect">
+            <a:avLst/>
+          </a:prstGeom>
+        </p:spPr>
+        <p:style>
+          <a:lnRef idx="1">
+            <a:schemeClr val="accent1"/>
+          </a:lnRef>
+          <a:fillRef idx="2">
+            <a:schemeClr val="accent1"/>
+          </a:fillRef>
+          <a:effectRef idx="1">
+            <a:schemeClr val="accent1"/>
+          </a:effectRef>
+          <a:fontRef idx="minor">
+            <a:schemeClr val="dk1"/>
+          </a:fontRef>
+        </p:style>
+        <p:txBody>
+          <a:bodyPr wrap="none">
+            <a:spAutoFit/>
+          </a:bodyPr>
+          <a:lstStyle/>
+          <a:p>
+            <a:r>
+              <a:rPr lang="en-US" altLang="ja-JP" sz="1400" dirty="0" err="1" smtClean="0"/>
+              <a:t>glycan:has_component</a:t>
+            </a:r>
+            <a:endParaRPr lang="ja-JP" altLang="en-US" sz="1400" dirty="0"/>
+          </a:p>
+        </p:txBody>
+      </p:sp>
+      <p:sp>
+        <p:nvSpPr>
+          <p:cNvPr id="99" name="円/楕円 98"/>
+          <p:cNvSpPr/>
+          <p:nvPr/>
+        </p:nvSpPr>
+        <p:spPr>
+          <a:xfrm>
+            <a:off x="9658447" y="3698397"/>
+            <a:ext cx="1948101" cy="933180"/>
+          </a:xfrm>
+          <a:prstGeom prst="ellipse">
+            <a:avLst/>
+          </a:prstGeom>
+        </p:spPr>
+        <p:style>
+          <a:lnRef idx="1">
+            <a:schemeClr val="accent6"/>
+          </a:lnRef>
+          <a:fillRef idx="2">
+            <a:schemeClr val="accent6"/>
+          </a:fillRef>
+          <a:effectRef idx="1">
+            <a:schemeClr val="accent6"/>
+          </a:effectRef>
+          <a:fontRef idx="minor">
+            <a:schemeClr val="dk1"/>
+          </a:fontRef>
+        </p:style>
+        <p:txBody>
+          <a:bodyPr lIns="128016" tIns="64008" rIns="128016" bIns="64008" spcCol="0" rtlCol="0" anchor="ctr"/>
+          <a:lstStyle/>
+          <a:p>
+            <a:pPr algn="ctr"/>
+            <a:r>
+              <a:rPr kumimoji="1" lang="en-US" altLang="ja-JP" sz="1400" dirty="0" smtClean="0"/>
+              <a:t>Resource entry</a:t>
+            </a:r>
+            <a:endParaRPr kumimoji="1" lang="ja-JP" altLang="en-US" sz="1400" dirty="0"/>
+          </a:p>
+        </p:txBody>
+      </p:sp>
+      <p:cxnSp>
+        <p:nvCxnSpPr>
+          <p:cNvPr id="100" name="直線矢印コネクタ 99"/>
+          <p:cNvCxnSpPr>
+            <a:stCxn id="4" idx="7"/>
+            <a:endCxn id="99" idx="2"/>
+          </p:cNvCxnSpPr>
+          <p:nvPr/>
+        </p:nvCxnSpPr>
+        <p:spPr>
+          <a:xfrm>
+            <a:off x="5324210" y="4069160"/>
+            <a:ext cx="4334237" cy="95827"/>
+          </a:xfrm>
+          <a:prstGeom prst="straightConnector1">
+            <a:avLst/>
+          </a:prstGeom>
+          <a:ln>
+            <a:tailEnd type="arrow"/>
+          </a:ln>
+        </p:spPr>
+        <p:style>
+          <a:lnRef idx="2">
+            <a:schemeClr val="accent1"/>
+          </a:lnRef>
+          <a:fillRef idx="0">
+            <a:schemeClr val="accent1"/>
+          </a:fillRef>
+          <a:effectRef idx="1">
+            <a:schemeClr val="accent1"/>
+          </a:effectRef>
+          <a:fontRef idx="minor">
+            <a:schemeClr val="tx1"/>
+          </a:fontRef>
+        </p:style>
+      </p:cxnSp>
+      <p:sp>
+        <p:nvSpPr>
+          <p:cNvPr id="102" name="正方形/長方形 101"/>
+          <p:cNvSpPr/>
+          <p:nvPr/>
+        </p:nvSpPr>
+        <p:spPr>
+          <a:xfrm>
+            <a:off x="7197984" y="3935640"/>
+            <a:ext cx="2151939" cy="307777"/>
+          </a:xfrm>
+          <a:prstGeom prst="rect">
+            <a:avLst/>
+          </a:prstGeom>
+        </p:spPr>
+        <p:style>
+          <a:lnRef idx="1">
+            <a:schemeClr val="accent1"/>
+          </a:lnRef>
+          <a:fillRef idx="2">
+            <a:schemeClr val="accent1"/>
+          </a:fillRef>
+          <a:effectRef idx="1">
+            <a:schemeClr val="accent1"/>
+          </a:effectRef>
+          <a:fontRef idx="minor">
+            <a:schemeClr val="dk1"/>
+          </a:fontRef>
+        </p:style>
+        <p:txBody>
+          <a:bodyPr wrap="none">
+            <a:spAutoFit/>
+          </a:bodyPr>
+          <a:lstStyle/>
+          <a:p>
+            <a:r>
+              <a:rPr lang="en-US" altLang="ja-JP" sz="1400" dirty="0" err="1" smtClean="0"/>
+              <a:t>glycan:has_resource_entry</a:t>
+            </a:r>
+            <a:endParaRPr lang="en-US" altLang="ja-JP" sz="1400" dirty="0" smtClean="0"/>
+          </a:p>
+        </p:txBody>
+      </p:sp>
+      <p:sp>
+        <p:nvSpPr>
+          <p:cNvPr id="106" name="円/楕円 105"/>
+          <p:cNvSpPr/>
+          <p:nvPr/>
+        </p:nvSpPr>
+        <p:spPr>
+          <a:xfrm>
+            <a:off x="3796888" y="1759926"/>
+            <a:ext cx="1235709" cy="725560"/>
+          </a:xfrm>
+          <a:prstGeom prst="ellipse">
+            <a:avLst/>
+          </a:prstGeom>
+        </p:spPr>
+        <p:style>
+          <a:lnRef idx="1">
             <a:schemeClr val="accent3"/>
           </a:lnRef>
           <a:fillRef idx="2">
@@ -6312,6 +7088,463 @@
           </a:fillRef>
           <a:effectRef idx="1">
             <a:schemeClr val="accent3"/>
+          </a:effectRef>
+          <a:fontRef idx="minor">
+            <a:schemeClr val="dk1"/>
+          </a:fontRef>
+        </p:style>
+        <p:txBody>
+          <a:bodyPr lIns="128016" tIns="64008" rIns="128016" bIns="64008" spcCol="0" rtlCol="0" anchor="ctr"/>
+          <a:lstStyle/>
+          <a:p>
+            <a:pPr algn="ctr"/>
+            <a:r>
+              <a:rPr lang="en-US" altLang="ja-JP" sz="1400" dirty="0" smtClean="0"/>
+              <a:t>string</a:t>
+            </a:r>
+            <a:endParaRPr kumimoji="1" lang="ja-JP" altLang="en-US" sz="1400" dirty="0"/>
+          </a:p>
+        </p:txBody>
+      </p:sp>
+      <p:cxnSp>
+        <p:nvCxnSpPr>
+          <p:cNvPr id="107" name="直線矢印コネクタ 106"/>
+          <p:cNvCxnSpPr>
+            <a:stCxn id="4" idx="0"/>
+            <a:endCxn id="106" idx="4"/>
+          </p:cNvCxnSpPr>
+          <p:nvPr/>
+        </p:nvCxnSpPr>
+        <p:spPr>
+          <a:xfrm flipH="1" flipV="1">
+            <a:off x="4414743" y="2485486"/>
+            <a:ext cx="16340" cy="1395317"/>
+          </a:xfrm>
+          <a:prstGeom prst="straightConnector1">
+            <a:avLst/>
+          </a:prstGeom>
+          <a:ln>
+            <a:tailEnd type="arrow"/>
+          </a:ln>
+        </p:spPr>
+        <p:style>
+          <a:lnRef idx="2">
+            <a:schemeClr val="accent1"/>
+          </a:lnRef>
+          <a:fillRef idx="0">
+            <a:schemeClr val="accent1"/>
+          </a:fillRef>
+          <a:effectRef idx="1">
+            <a:schemeClr val="accent1"/>
+          </a:effectRef>
+          <a:fontRef idx="minor">
+            <a:schemeClr val="tx1"/>
+          </a:fontRef>
+        </p:style>
+      </p:cxnSp>
+      <p:sp>
+        <p:nvSpPr>
+          <p:cNvPr id="108" name="正方形/長方形 107"/>
+          <p:cNvSpPr/>
+          <p:nvPr/>
+        </p:nvSpPr>
+        <p:spPr>
+          <a:xfrm>
+            <a:off x="3426633" y="2719683"/>
+            <a:ext cx="2082621" cy="307777"/>
+          </a:xfrm>
+          <a:prstGeom prst="rect">
+            <a:avLst/>
+          </a:prstGeom>
+        </p:spPr>
+        <p:style>
+          <a:lnRef idx="1">
+            <a:schemeClr val="accent3"/>
+          </a:lnRef>
+          <a:fillRef idx="2">
+            <a:schemeClr val="accent3"/>
+          </a:fillRef>
+          <a:effectRef idx="1">
+            <a:schemeClr val="accent3"/>
+          </a:effectRef>
+          <a:fontRef idx="minor">
+            <a:schemeClr val="dk1"/>
+          </a:fontRef>
+        </p:style>
+        <p:txBody>
+          <a:bodyPr wrap="none">
+            <a:spAutoFit/>
+          </a:bodyPr>
+          <a:lstStyle/>
+          <a:p>
+            <a:r>
+              <a:rPr lang="en-US" altLang="ja-JP" sz="1400" dirty="0" err="1" smtClean="0"/>
+              <a:t>glytoucan:has_primary_id</a:t>
+            </a:r>
+            <a:endParaRPr lang="ja-JP" altLang="en-US" sz="1400" dirty="0"/>
+          </a:p>
+        </p:txBody>
+      </p:sp>
+      <p:sp>
+        <p:nvSpPr>
+          <p:cNvPr id="119" name="正方形/長方形 118"/>
+          <p:cNvSpPr/>
+          <p:nvPr/>
+        </p:nvSpPr>
+        <p:spPr>
+          <a:xfrm>
+            <a:off x="3659077" y="1606037"/>
+            <a:ext cx="1544012" cy="307777"/>
+          </a:xfrm>
+          <a:prstGeom prst="rect">
+            <a:avLst/>
+          </a:prstGeom>
+        </p:spPr>
+        <p:style>
+          <a:lnRef idx="1">
+            <a:schemeClr val="accent2"/>
+          </a:lnRef>
+          <a:fillRef idx="2">
+            <a:schemeClr val="accent2"/>
+          </a:fillRef>
+          <a:effectRef idx="1">
+            <a:schemeClr val="accent2"/>
+          </a:effectRef>
+          <a:fontRef idx="minor">
+            <a:schemeClr val="dk1"/>
+          </a:fontRef>
+        </p:style>
+        <p:txBody>
+          <a:bodyPr wrap="none">
+            <a:spAutoFit/>
+          </a:bodyPr>
+          <a:lstStyle/>
+          <a:p>
+            <a:r>
+              <a:rPr lang="en-US" altLang="ja-JP" sz="1400" dirty="0"/>
+              <a:t>Accession Number</a:t>
+            </a:r>
+            <a:endParaRPr lang="ja-JP" altLang="en-US" sz="1400" dirty="0"/>
+          </a:p>
+        </p:txBody>
+      </p:sp>
+      <p:sp>
+        <p:nvSpPr>
+          <p:cNvPr id="120" name="正方形/長方形 119"/>
+          <p:cNvSpPr/>
+          <p:nvPr/>
+        </p:nvSpPr>
+        <p:spPr>
+          <a:xfrm>
+            <a:off x="9998387" y="3522962"/>
+            <a:ext cx="1261884" cy="307777"/>
+          </a:xfrm>
+          <a:prstGeom prst="rect">
+            <a:avLst/>
+          </a:prstGeom>
+        </p:spPr>
+        <p:style>
+          <a:lnRef idx="1">
+            <a:schemeClr val="accent2"/>
+          </a:lnRef>
+          <a:fillRef idx="2">
+            <a:schemeClr val="accent2"/>
+          </a:fillRef>
+          <a:effectRef idx="1">
+            <a:schemeClr val="accent2"/>
+          </a:effectRef>
+          <a:fontRef idx="minor">
+            <a:schemeClr val="dk1"/>
+          </a:fontRef>
+        </p:style>
+        <p:txBody>
+          <a:bodyPr wrap="none">
+            <a:spAutoFit/>
+          </a:bodyPr>
+          <a:lstStyle/>
+          <a:p>
+            <a:r>
+              <a:rPr lang="en-US" altLang="ja-JP" sz="1400" dirty="0" err="1"/>
+              <a:t>Glytoucan</a:t>
+            </a:r>
+            <a:r>
+              <a:rPr lang="en-US" altLang="ja-JP" sz="1400" dirty="0"/>
+              <a:t> URL</a:t>
+            </a:r>
+            <a:endParaRPr lang="ja-JP" altLang="en-US" sz="1400" dirty="0"/>
+          </a:p>
+        </p:txBody>
+      </p:sp>
+      <p:sp>
+        <p:nvSpPr>
+          <p:cNvPr id="147" name="円/楕円 146"/>
+          <p:cNvSpPr/>
+          <p:nvPr/>
+        </p:nvSpPr>
+        <p:spPr>
+          <a:xfrm>
+            <a:off x="4336055" y="7059827"/>
+            <a:ext cx="1957653" cy="933180"/>
+          </a:xfrm>
+          <a:prstGeom prst="ellipse">
+            <a:avLst/>
+          </a:prstGeom>
+        </p:spPr>
+        <p:style>
+          <a:lnRef idx="1">
+            <a:schemeClr val="accent6"/>
+          </a:lnRef>
+          <a:fillRef idx="2">
+            <a:schemeClr val="accent6"/>
+          </a:fillRef>
+          <a:effectRef idx="1">
+            <a:schemeClr val="accent6"/>
+          </a:effectRef>
+          <a:fontRef idx="minor">
+            <a:schemeClr val="dk1"/>
+          </a:fontRef>
+        </p:style>
+        <p:txBody>
+          <a:bodyPr lIns="128016" tIns="64008" rIns="128016" bIns="64008" spcCol="0" rtlCol="0" anchor="ctr"/>
+          <a:lstStyle/>
+          <a:p>
+            <a:pPr algn="ctr"/>
+            <a:r>
+              <a:rPr kumimoji="1" lang="en-US" altLang="ja-JP" sz="1400" dirty="0" err="1" smtClean="0"/>
+              <a:t>Glycosequence</a:t>
+            </a:r>
+            <a:endParaRPr kumimoji="1" lang="ja-JP" altLang="en-US" sz="1400" dirty="0"/>
+          </a:p>
+        </p:txBody>
+      </p:sp>
+      <p:cxnSp>
+        <p:nvCxnSpPr>
+          <p:cNvPr id="150" name="直線矢印コネクタ 149"/>
+          <p:cNvCxnSpPr>
+            <a:stCxn id="4" idx="4"/>
+            <a:endCxn id="147" idx="0"/>
+          </p:cNvCxnSpPr>
+          <p:nvPr/>
+        </p:nvCxnSpPr>
+        <p:spPr>
+          <a:xfrm>
+            <a:off x="4431083" y="5166987"/>
+            <a:ext cx="883799" cy="1892840"/>
+          </a:xfrm>
+          <a:prstGeom prst="straightConnector1">
+            <a:avLst/>
+          </a:prstGeom>
+          <a:ln>
+            <a:tailEnd type="arrow"/>
+          </a:ln>
+        </p:spPr>
+        <p:style>
+          <a:lnRef idx="2">
+            <a:schemeClr val="accent1"/>
+          </a:lnRef>
+          <a:fillRef idx="0">
+            <a:schemeClr val="accent1"/>
+          </a:fillRef>
+          <a:effectRef idx="1">
+            <a:schemeClr val="accent1"/>
+          </a:effectRef>
+          <a:fontRef idx="minor">
+            <a:schemeClr val="tx1"/>
+          </a:fontRef>
+        </p:style>
+      </p:cxnSp>
+      <p:sp>
+        <p:nvSpPr>
+          <p:cNvPr id="148" name="正方形/長方形 147"/>
+          <p:cNvSpPr/>
+          <p:nvPr/>
+        </p:nvSpPr>
+        <p:spPr>
+          <a:xfrm>
+            <a:off x="4143156" y="6106642"/>
+            <a:ext cx="2110561" cy="307777"/>
+          </a:xfrm>
+          <a:prstGeom prst="rect">
+            <a:avLst/>
+          </a:prstGeom>
+        </p:spPr>
+        <p:style>
+          <a:lnRef idx="1">
+            <a:schemeClr val="accent1"/>
+          </a:lnRef>
+          <a:fillRef idx="2">
+            <a:schemeClr val="accent1"/>
+          </a:fillRef>
+          <a:effectRef idx="1">
+            <a:schemeClr val="accent1"/>
+          </a:effectRef>
+          <a:fontRef idx="minor">
+            <a:schemeClr val="dk1"/>
+          </a:fontRef>
+        </p:style>
+        <p:txBody>
+          <a:bodyPr wrap="none">
+            <a:spAutoFit/>
+          </a:bodyPr>
+          <a:lstStyle/>
+          <a:p>
+            <a:r>
+              <a:rPr lang="en-US" altLang="ja-JP" sz="1400" dirty="0" err="1" smtClean="0"/>
+              <a:t>glycan:has_glycosequence</a:t>
+            </a:r>
+            <a:endParaRPr lang="en-US" altLang="ja-JP" sz="1400" dirty="0" smtClean="0"/>
+          </a:p>
+        </p:txBody>
+      </p:sp>
+      <p:cxnSp>
+        <p:nvCxnSpPr>
+          <p:cNvPr id="176" name="直線矢印コネクタ 175"/>
+          <p:cNvCxnSpPr>
+            <a:stCxn id="4" idx="7"/>
+            <a:endCxn id="180" idx="2"/>
+          </p:cNvCxnSpPr>
+          <p:nvPr/>
+        </p:nvCxnSpPr>
+        <p:spPr>
+          <a:xfrm flipV="1">
+            <a:off x="5324210" y="2790151"/>
+            <a:ext cx="2859892" cy="1279009"/>
+          </a:xfrm>
+          <a:prstGeom prst="straightConnector1">
+            <a:avLst/>
+          </a:prstGeom>
+          <a:ln>
+            <a:tailEnd type="arrow"/>
+          </a:ln>
+        </p:spPr>
+        <p:style>
+          <a:lnRef idx="2">
+            <a:schemeClr val="accent1"/>
+          </a:lnRef>
+          <a:fillRef idx="0">
+            <a:schemeClr val="accent1"/>
+          </a:fillRef>
+          <a:effectRef idx="1">
+            <a:schemeClr val="accent1"/>
+          </a:effectRef>
+          <a:fontRef idx="minor">
+            <a:schemeClr val="tx1"/>
+          </a:fontRef>
+        </p:style>
+      </p:cxnSp>
+      <p:sp>
+        <p:nvSpPr>
+          <p:cNvPr id="174" name="正方形/長方形 173"/>
+          <p:cNvSpPr/>
+          <p:nvPr/>
+        </p:nvSpPr>
+        <p:spPr>
+          <a:xfrm>
+            <a:off x="5576494" y="3241870"/>
+            <a:ext cx="2553441" cy="307777"/>
+          </a:xfrm>
+          <a:prstGeom prst="rect">
+            <a:avLst/>
+          </a:prstGeom>
+        </p:spPr>
+        <p:style>
+          <a:lnRef idx="1">
+            <a:schemeClr val="accent1"/>
+          </a:lnRef>
+          <a:fillRef idx="2">
+            <a:schemeClr val="accent1"/>
+          </a:fillRef>
+          <a:effectRef idx="1">
+            <a:schemeClr val="accent1"/>
+          </a:effectRef>
+          <a:fontRef idx="minor">
+            <a:schemeClr val="dk1"/>
+          </a:fontRef>
+        </p:style>
+        <p:txBody>
+          <a:bodyPr wrap="none">
+            <a:spAutoFit/>
+          </a:bodyPr>
+          <a:lstStyle/>
+          <a:p>
+            <a:r>
+              <a:rPr lang="en-US" altLang="ja-JP" sz="1400" dirty="0" err="1" smtClean="0"/>
+              <a:t>glytoucan:has_derivatized_mass</a:t>
+            </a:r>
+            <a:endParaRPr lang="ja-JP" altLang="en-US" sz="1400" dirty="0"/>
+          </a:p>
+        </p:txBody>
+      </p:sp>
+      <p:sp>
+        <p:nvSpPr>
+          <p:cNvPr id="180" name="円/楕円 179"/>
+          <p:cNvSpPr/>
+          <p:nvPr/>
+        </p:nvSpPr>
+        <p:spPr>
+          <a:xfrm>
+            <a:off x="8184102" y="2323561"/>
+            <a:ext cx="2381738" cy="933180"/>
+          </a:xfrm>
+          <a:prstGeom prst="ellipse">
+            <a:avLst/>
+          </a:prstGeom>
+        </p:spPr>
+        <p:style>
+          <a:lnRef idx="1">
+            <a:schemeClr val="accent6"/>
+          </a:lnRef>
+          <a:fillRef idx="2">
+            <a:schemeClr val="accent6"/>
+          </a:fillRef>
+          <a:effectRef idx="1">
+            <a:schemeClr val="accent6"/>
+          </a:effectRef>
+          <a:fontRef idx="minor">
+            <a:schemeClr val="dk1"/>
+          </a:fontRef>
+        </p:style>
+        <p:txBody>
+          <a:bodyPr lIns="128016" tIns="64008" rIns="128016" bIns="64008" spcCol="0" rtlCol="0" anchor="ctr"/>
+          <a:lstStyle/>
+          <a:p>
+            <a:pPr algn="ctr"/>
+            <a:r>
+              <a:rPr lang="en-US" altLang="ja-JP" sz="1400" dirty="0" err="1" smtClean="0"/>
+              <a:t>Derivatized</a:t>
+            </a:r>
+            <a:r>
+              <a:rPr lang="en-US" altLang="ja-JP" sz="1400" dirty="0" smtClean="0"/>
+              <a:t> mass</a:t>
+            </a:r>
+            <a:endParaRPr kumimoji="1" lang="ja-JP" altLang="en-US" sz="1400" dirty="0"/>
+          </a:p>
+        </p:txBody>
+      </p:sp>
+      <p:sp>
+        <p:nvSpPr>
+          <p:cNvPr id="116" name="正方形/長方形 115"/>
+          <p:cNvSpPr/>
+          <p:nvPr/>
+        </p:nvSpPr>
+        <p:spPr>
+          <a:xfrm>
+            <a:off x="8184102" y="6902955"/>
+            <a:ext cx="1814285" cy="307777"/>
+          </a:xfrm>
+          <a:prstGeom prst="rect">
+            <a:avLst/>
+          </a:prstGeom>
+        </p:spPr>
+        <p:style>
+          <a:lnRef idx="1">
+            <a:schemeClr val="accent2"/>
+          </a:lnRef>
+          <a:fillRef idx="2">
+            <a:schemeClr val="accent2"/>
+          </a:fillRef>
+          <a:effectRef idx="1">
+            <a:schemeClr val="accent2"/>
           </a:effectRef>
           <a:fontRef idx="minor">
             <a:schemeClr val="dk1"/>
@@ -6323,58 +7556,31 @@
           </a:bodyPr>
           <a:lstStyle/>
           <a:p>
+            <a:r>
+              <a:rPr lang="en-US" altLang="ja-JP" sz="1400" dirty="0" smtClean="0"/>
+              <a:t>Structure Image URL</a:t>
+            </a:r>
             <a:endParaRPr lang="ja-JP" altLang="en-US" sz="1400" dirty="0"/>
-          </a:p>
-        </p:txBody>
-      </p:sp>
-      <p:sp>
-        <p:nvSpPr>
-          <p:cNvPr id="7" name="円/楕円 6"/>
-          <p:cNvSpPr/>
-          <p:nvPr/>
-        </p:nvSpPr>
-        <p:spPr>
-          <a:xfrm>
-            <a:off x="5596244" y="4176209"/>
-            <a:ext cx="1235709" cy="725560"/>
-          </a:xfrm>
-          <a:prstGeom prst="ellipse">
-            <a:avLst/>
-          </a:prstGeom>
-        </p:spPr>
-        <p:style>
-          <a:lnRef idx="1">
-            <a:schemeClr val="accent3"/>
-          </a:lnRef>
-          <a:fillRef idx="2">
-            <a:schemeClr val="accent3"/>
-          </a:fillRef>
-          <a:effectRef idx="1">
-            <a:schemeClr val="accent3"/>
-          </a:effectRef>
-          <a:fontRef idx="minor">
-            <a:schemeClr val="dk1"/>
-          </a:fontRef>
-        </p:style>
-        <p:txBody>
-          <a:bodyPr lIns="128016" tIns="64008" rIns="128016" bIns="64008" spcCol="0" rtlCol="0" anchor="ctr"/>
-          <a:lstStyle/>
-          <a:p>
-            <a:pPr algn="ctr"/>
-            <a:endParaRPr kumimoji="1" lang="ja-JP" altLang="en-US" sz="1400" dirty="0"/>
           </a:p>
         </p:txBody>
       </p:sp>
     </p:spTree>
     <p:extLst>
       <p:ext uri="{BB962C8B-B14F-4D97-AF65-F5344CB8AC3E}">
-        <p14:creationId xmlns:p14="http://schemas.microsoft.com/office/powerpoint/2010/main" val="1670822750"/>
+        <p14:creationId xmlns:p14="http://schemas.microsoft.com/office/powerpoint/2010/main" val="1688706070"/>
       </p:ext>
     </p:extLst>
   </p:cSld>
   <p:clrMapOvr>
     <a:masterClrMapping/>
   </p:clrMapOvr>
+  <p:timing>
+    <p:tnLst>
+      <p:par>
+        <p:cTn xmlns:p14="http://schemas.microsoft.com/office/powerpoint/2010/main" id="1" dur="indefinite" restart="never" nodeType="tmRoot"/>
+      </p:par>
+    </p:tnLst>
+  </p:timing>
 </p:sld>
 </file>
 
@@ -14274,84 +15480,6 @@
           </a:p>
         </p:txBody>
       </p:sp>
-      <p:sp>
-        <p:nvSpPr>
-          <p:cNvPr id="12" name="円/楕円 11"/>
-          <p:cNvSpPr/>
-          <p:nvPr/>
-        </p:nvSpPr>
-        <p:spPr>
-          <a:xfrm>
-            <a:off x="7713617" y="7059827"/>
-            <a:ext cx="1627320" cy="666557"/>
-          </a:xfrm>
-          <a:prstGeom prst="ellipse">
-            <a:avLst/>
-          </a:prstGeom>
-        </p:spPr>
-        <p:style>
-          <a:lnRef idx="1">
-            <a:schemeClr val="accent6"/>
-          </a:lnRef>
-          <a:fillRef idx="2">
-            <a:schemeClr val="accent6"/>
-          </a:fillRef>
-          <a:effectRef idx="1">
-            <a:schemeClr val="accent6"/>
-          </a:effectRef>
-          <a:fontRef idx="minor">
-            <a:schemeClr val="dk1"/>
-          </a:fontRef>
-        </p:style>
-        <p:txBody>
-          <a:bodyPr rtlCol="0" anchor="ctr"/>
-          <a:lstStyle/>
-          <a:p>
-            <a:pPr algn="ctr"/>
-            <a:r>
-              <a:rPr lang="en-US" altLang="ja-JP" sz="1400" dirty="0" smtClean="0"/>
-              <a:t>Image</a:t>
-            </a:r>
-            <a:endParaRPr kumimoji="1" lang="ja-JP" altLang="en-US" sz="1400" dirty="0"/>
-          </a:p>
-        </p:txBody>
-      </p:sp>
-      <p:cxnSp>
-        <p:nvCxnSpPr>
-          <p:cNvPr id="14" name="直線矢印コネクタ 13"/>
-          <p:cNvCxnSpPr>
-            <a:stCxn id="4" idx="5"/>
-            <a:endCxn id="12" idx="1"/>
-          </p:cNvCxnSpPr>
-          <p:nvPr/>
-        </p:nvCxnSpPr>
-        <p:spPr>
-          <a:xfrm>
-            <a:off x="5324210" y="4978630"/>
-            <a:ext cx="2627722" cy="2178812"/>
-          </a:xfrm>
-          <a:prstGeom prst="straightConnector1">
-            <a:avLst/>
-          </a:prstGeom>
-          <a:ln>
-            <a:tailEnd type="arrow"/>
-          </a:ln>
-        </p:spPr>
-        <p:style>
-          <a:lnRef idx="2">
-            <a:schemeClr val="accent1"/>
-          </a:lnRef>
-          <a:fillRef idx="0">
-            <a:schemeClr val="accent1"/>
-          </a:fillRef>
-          <a:effectRef idx="1">
-            <a:schemeClr val="accent1"/>
-          </a:effectRef>
-          <a:fontRef idx="minor">
-            <a:schemeClr val="tx1"/>
-          </a:fontRef>
-        </p:style>
-      </p:cxnSp>
       <p:cxnSp>
         <p:nvCxnSpPr>
           <p:cNvPr id="16" name="直線矢印コネクタ 15"/>
@@ -14469,49 +15597,6 @@
       </p:sp>
       <p:sp>
         <p:nvSpPr>
-          <p:cNvPr id="89" name="正方形/長方形 88"/>
-          <p:cNvSpPr/>
-          <p:nvPr/>
-        </p:nvSpPr>
-        <p:spPr>
-          <a:xfrm>
-            <a:off x="6474407" y="6287401"/>
-            <a:ext cx="1480343" cy="307777"/>
-          </a:xfrm>
-          <a:prstGeom prst="rect">
-            <a:avLst/>
-          </a:prstGeom>
-        </p:spPr>
-        <p:style>
-          <a:lnRef idx="1">
-            <a:schemeClr val="accent1"/>
-          </a:lnRef>
-          <a:fillRef idx="2">
-            <a:schemeClr val="accent1"/>
-          </a:fillRef>
-          <a:effectRef idx="1">
-            <a:schemeClr val="accent1"/>
-          </a:effectRef>
-          <a:fontRef idx="minor">
-            <a:schemeClr val="dk1"/>
-          </a:fontRef>
-        </p:style>
-        <p:txBody>
-          <a:bodyPr wrap="none">
-            <a:spAutoFit/>
-          </a:bodyPr>
-          <a:lstStyle/>
-          <a:p>
-            <a:r>
-              <a:rPr lang="en-US" altLang="ja-JP" sz="1400" dirty="0" err="1" smtClean="0"/>
-              <a:t>glycan:has_image</a:t>
-            </a:r>
-            <a:endParaRPr lang="ja-JP" altLang="en-US" sz="1400" dirty="0"/>
-          </a:p>
-        </p:txBody>
-      </p:sp>
-      <p:sp>
-        <p:nvSpPr>
           <p:cNvPr id="95" name="正方形/長方形 94"/>
           <p:cNvSpPr/>
           <p:nvPr/>
@@ -15131,53 +16216,10 @@
           </a:p>
         </p:txBody>
       </p:sp>
-      <p:sp>
-        <p:nvSpPr>
-          <p:cNvPr id="116" name="正方形/長方形 115"/>
-          <p:cNvSpPr/>
-          <p:nvPr/>
-        </p:nvSpPr>
-        <p:spPr>
-          <a:xfrm>
-            <a:off x="8184102" y="6902955"/>
-            <a:ext cx="1814285" cy="307777"/>
-          </a:xfrm>
-          <a:prstGeom prst="rect">
-            <a:avLst/>
-          </a:prstGeom>
-        </p:spPr>
-        <p:style>
-          <a:lnRef idx="1">
-            <a:schemeClr val="accent2"/>
-          </a:lnRef>
-          <a:fillRef idx="2">
-            <a:schemeClr val="accent2"/>
-          </a:fillRef>
-          <a:effectRef idx="1">
-            <a:schemeClr val="accent2"/>
-          </a:effectRef>
-          <a:fontRef idx="minor">
-            <a:schemeClr val="dk1"/>
-          </a:fontRef>
-        </p:style>
-        <p:txBody>
-          <a:bodyPr wrap="square">
-            <a:spAutoFit/>
-          </a:bodyPr>
-          <a:lstStyle/>
-          <a:p>
-            <a:r>
-              <a:rPr lang="en-US" altLang="ja-JP" sz="1400" dirty="0" smtClean="0"/>
-              <a:t>Structure Image URL</a:t>
-            </a:r>
-            <a:endParaRPr lang="ja-JP" altLang="en-US" sz="1400" dirty="0"/>
-          </a:p>
-        </p:txBody>
-      </p:sp>
     </p:spTree>
     <p:extLst>
       <p:ext uri="{BB962C8B-B14F-4D97-AF65-F5344CB8AC3E}">
-        <p14:creationId xmlns:p14="http://schemas.microsoft.com/office/powerpoint/2010/main" val="1688706070"/>
+        <p14:creationId xmlns:p14="http://schemas.microsoft.com/office/powerpoint/2010/main" val="260031655"/>
       </p:ext>
     </p:extLst>
   </p:cSld>
@@ -17708,11 +18750,7 @@
             <a:pPr algn="ctr"/>
             <a:r>
               <a:rPr lang="en-US" altLang="ja-JP" sz="1200" dirty="0" smtClean="0"/>
-              <a:t>(CFG, </a:t>
-            </a:r>
-            <a:r>
-              <a:rPr lang="en-US" altLang="ja-JP" sz="1200" dirty="0" smtClean="0"/>
-              <a:t>Oxford, etc.)</a:t>
+              <a:t>(CFG, Oxford, etc.)</a:t>
             </a:r>
             <a:endParaRPr kumimoji="1" lang="ja-JP" altLang="en-US" sz="1200" dirty="0"/>
           </a:p>
@@ -19095,7 +20133,6 @@
               <a:rPr lang="en-US" altLang="ja-JP" sz="1200" dirty="0" smtClean="0"/>
               <a:t>string</a:t>
             </a:r>
-            <a:endParaRPr lang="en-US" altLang="ja-JP" sz="1200" dirty="0" smtClean="0"/>
           </a:p>
         </p:txBody>
       </p:sp>

</xml_diff>